<commit_message>
replace Japanese text to get consistent fonts used
Change-Id: I7c9504aa5adc741f773395b9d5bf49286de98885
Reviewed-on: https://gerrit.libreoffice.org/c/core/+/195450
Tested-by: Jenkins
Reviewed-by: Caolán McNamara <caolan.mcnamara@collabora.com>
</commit_message>
<xml_diff>
--- a/sd/qa/unit/data/pptx/smartart-tdf134221.pptx
+++ b/sd/qa/unit/data/pptx/smartart-tdf134221.pptx
@@ -3332,7 +3332,7 @@
 
 <file path=ppt/slideLayouts/slideLayout1.xml><?xml version="1.0" encoding="utf-8"?>
 <p:sldLayout xmlns:a="http://schemas.openxmlformats.org/drawingml/2006/main" xmlns:r="http://schemas.openxmlformats.org/officeDocument/2006/relationships" xmlns:p="http://schemas.openxmlformats.org/presentationml/2006/main" type="title" preserve="1">
-  <p:cSld name="标题幻灯片">
+  <p:cSld name="THING">
     <p:spTree>
       <p:nvGrpSpPr>
         <p:cNvPr id="1" name=""/>
@@ -3369,7 +3369,7 @@
           <a:p>
             <a:r>
               <a:rPr lang="zh-CN" altLang="en-US" smtClean="0"/>
-              <a:t>单击此处编辑母版标题样式</a:t>
+              <a:t>HELLO</a:t>
             </a:r>
             <a:endParaRPr lang="zh-CN" altLang="en-US"/>
           </a:p>
@@ -3488,7 +3488,7 @@
           <a:p>
             <a:r>
               <a:rPr lang="zh-CN" altLang="en-US" smtClean="0"/>
-              <a:t>单击此处编辑母版副标题样式</a:t>
+              <a:t>WORLD</a:t>
             </a:r>
             <a:endParaRPr lang="zh-CN" altLang="en-US"/>
           </a:p>
@@ -3569,7 +3569,7 @@
 
 <file path=ppt/slideLayouts/slideLayout10.xml><?xml version="1.0" encoding="utf-8"?>
 <p:sldLayout xmlns:a="http://schemas.openxmlformats.org/drawingml/2006/main" xmlns:r="http://schemas.openxmlformats.org/officeDocument/2006/relationships" xmlns:p="http://schemas.openxmlformats.org/presentationml/2006/main" type="vertTx" preserve="1">
-  <p:cSld name="标题和竖排文字">
+  <p:cSld name="EXAMPLE">
     <p:spTree>
       <p:nvGrpSpPr>
         <p:cNvPr id="1" name=""/>
@@ -3601,7 +3601,7 @@
           <a:p>
             <a:r>
               <a:rPr lang="zh-CN" altLang="en-US" smtClean="0"/>
-              <a:t>单击此处编辑母版标题样式</a:t>
+              <a:t>HELLO</a:t>
             </a:r>
             <a:endParaRPr lang="zh-CN" altLang="en-US"/>
           </a:p>
@@ -3625,35 +3625,35 @@
             <a:pPr lvl="0"/>
             <a:r>
               <a:rPr lang="zh-CN" altLang="en-US" smtClean="0"/>
-              <a:t>单击此处编辑母版文本样式</a:t>
+              <a:t>SOMETHING</a:t>
             </a:r>
           </a:p>
           <a:p>
             <a:pPr lvl="1"/>
             <a:r>
               <a:rPr lang="zh-CN" altLang="en-US" smtClean="0"/>
-              <a:t>第二级</a:t>
+              <a:t>FOO</a:t>
             </a:r>
           </a:p>
           <a:p>
             <a:pPr lvl="2"/>
             <a:r>
               <a:rPr lang="zh-CN" altLang="en-US" smtClean="0"/>
-              <a:t>第三级</a:t>
+              <a:t>BAR</a:t>
             </a:r>
           </a:p>
           <a:p>
             <a:pPr lvl="3"/>
             <a:r>
               <a:rPr lang="zh-CN" altLang="en-US" smtClean="0"/>
-              <a:t>第四级</a:t>
+              <a:t>BAR</a:t>
             </a:r>
           </a:p>
           <a:p>
             <a:pPr lvl="4"/>
             <a:r>
               <a:rPr lang="zh-CN" altLang="en-US" smtClean="0"/>
-              <a:t>第五级</a:t>
+              <a:t>BAZ</a:t>
             </a:r>
             <a:endParaRPr lang="zh-CN" altLang="en-US"/>
           </a:p>
@@ -3734,7 +3734,7 @@
 
 <file path=ppt/slideLayouts/slideLayout11.xml><?xml version="1.0" encoding="utf-8"?>
 <p:sldLayout xmlns:a="http://schemas.openxmlformats.org/drawingml/2006/main" xmlns:r="http://schemas.openxmlformats.org/officeDocument/2006/relationships" xmlns:p="http://schemas.openxmlformats.org/presentationml/2006/main" type="vertTitleAndTx" preserve="1">
-  <p:cSld name="垂直排列标题与文本">
+  <p:cSld name="SOMETHING">
     <p:spTree>
       <p:nvGrpSpPr>
         <p:cNvPr id="1" name=""/>
@@ -3771,7 +3771,7 @@
           <a:p>
             <a:r>
               <a:rPr lang="zh-CN" altLang="en-US" smtClean="0"/>
-              <a:t>单击此处编辑母版标题样式</a:t>
+              <a:t>HELLO</a:t>
             </a:r>
             <a:endParaRPr lang="zh-CN" altLang="en-US"/>
           </a:p>
@@ -3800,35 +3800,35 @@
             <a:pPr lvl="0"/>
             <a:r>
               <a:rPr lang="zh-CN" altLang="en-US" smtClean="0"/>
-              <a:t>单击此处编辑母版文本样式</a:t>
+              <a:t>SOMETHING</a:t>
             </a:r>
           </a:p>
           <a:p>
             <a:pPr lvl="1"/>
             <a:r>
               <a:rPr lang="zh-CN" altLang="en-US" smtClean="0"/>
-              <a:t>第二级</a:t>
+              <a:t>FOO</a:t>
             </a:r>
           </a:p>
           <a:p>
             <a:pPr lvl="2"/>
             <a:r>
               <a:rPr lang="zh-CN" altLang="en-US" smtClean="0"/>
-              <a:t>第三级</a:t>
+              <a:t>BAR</a:t>
             </a:r>
           </a:p>
           <a:p>
             <a:pPr lvl="3"/>
             <a:r>
               <a:rPr lang="zh-CN" altLang="en-US" smtClean="0"/>
-              <a:t>第四级</a:t>
+              <a:t>BAR</a:t>
             </a:r>
           </a:p>
           <a:p>
             <a:pPr lvl="4"/>
             <a:r>
               <a:rPr lang="zh-CN" altLang="en-US" smtClean="0"/>
-              <a:t>第五级</a:t>
+              <a:t>BAZ</a:t>
             </a:r>
             <a:endParaRPr lang="zh-CN" altLang="en-US"/>
           </a:p>
@@ -3909,7 +3909,7 @@
 
 <file path=ppt/slideLayouts/slideLayout2.xml><?xml version="1.0" encoding="utf-8"?>
 <p:sldLayout xmlns:a="http://schemas.openxmlformats.org/drawingml/2006/main" xmlns:r="http://schemas.openxmlformats.org/officeDocument/2006/relationships" xmlns:p="http://schemas.openxmlformats.org/presentationml/2006/main" type="obj" preserve="1">
-  <p:cSld name="标题和内容">
+  <p:cSld name="STYLE">
     <p:spTree>
       <p:nvGrpSpPr>
         <p:cNvPr id="1" name=""/>
@@ -3941,7 +3941,7 @@
           <a:p>
             <a:r>
               <a:rPr lang="zh-CN" altLang="en-US" smtClean="0"/>
-              <a:t>单击此处编辑母版标题样式</a:t>
+              <a:t>HELLO</a:t>
             </a:r>
             <a:endParaRPr lang="zh-CN" altLang="en-US"/>
           </a:p>
@@ -3965,35 +3965,35 @@
             <a:pPr lvl="0"/>
             <a:r>
               <a:rPr lang="zh-CN" altLang="en-US" smtClean="0"/>
-              <a:t>单击此处编辑母版文本样式</a:t>
+              <a:t>SOMETHING</a:t>
             </a:r>
           </a:p>
           <a:p>
             <a:pPr lvl="1"/>
             <a:r>
               <a:rPr lang="zh-CN" altLang="en-US" smtClean="0"/>
-              <a:t>第二级</a:t>
+              <a:t>FOO</a:t>
             </a:r>
           </a:p>
           <a:p>
             <a:pPr lvl="2"/>
             <a:r>
               <a:rPr lang="zh-CN" altLang="en-US" smtClean="0"/>
-              <a:t>第三级</a:t>
+              <a:t>BAR</a:t>
             </a:r>
           </a:p>
           <a:p>
             <a:pPr lvl="3"/>
             <a:r>
               <a:rPr lang="zh-CN" altLang="en-US" smtClean="0"/>
-              <a:t>第四级</a:t>
+              <a:t>BAR</a:t>
             </a:r>
           </a:p>
           <a:p>
             <a:pPr lvl="4"/>
             <a:r>
               <a:rPr lang="zh-CN" altLang="en-US" smtClean="0"/>
-              <a:t>第五级</a:t>
+              <a:t>BAZ</a:t>
             </a:r>
             <a:endParaRPr lang="zh-CN" altLang="en-US"/>
           </a:p>
@@ -4074,7 +4074,7 @@
 
 <file path=ppt/slideLayouts/slideLayout3.xml><?xml version="1.0" encoding="utf-8"?>
 <p:sldLayout xmlns:a="http://schemas.openxmlformats.org/drawingml/2006/main" xmlns:r="http://schemas.openxmlformats.org/officeDocument/2006/relationships" xmlns:p="http://schemas.openxmlformats.org/presentationml/2006/main" type="secHead" preserve="1">
-  <p:cSld name="节标题">
+  <p:cSld name="ONE">
     <p:spTree>
       <p:nvGrpSpPr>
         <p:cNvPr id="1" name=""/>
@@ -4115,7 +4115,7 @@
           <a:p>
             <a:r>
               <a:rPr lang="zh-CN" altLang="en-US" smtClean="0"/>
-              <a:t>单击此处编辑母版标题样式</a:t>
+              <a:t>HELLO</a:t>
             </a:r>
             <a:endParaRPr lang="zh-CN" altLang="en-US"/>
           </a:p>
@@ -4235,7 +4235,7 @@
             <a:pPr lvl="0"/>
             <a:r>
               <a:rPr lang="zh-CN" altLang="en-US" smtClean="0"/>
-              <a:t>单击此处编辑母版文本样式</a:t>
+              <a:t>SOMETHING</a:t>
             </a:r>
           </a:p>
         </p:txBody>
@@ -4315,7 +4315,7 @@
 
 <file path=ppt/slideLayouts/slideLayout4.xml><?xml version="1.0" encoding="utf-8"?>
 <p:sldLayout xmlns:a="http://schemas.openxmlformats.org/drawingml/2006/main" xmlns:r="http://schemas.openxmlformats.org/officeDocument/2006/relationships" xmlns:p="http://schemas.openxmlformats.org/presentationml/2006/main" type="twoObj" preserve="1">
-  <p:cSld name="两栏内容">
+  <p:cSld name="FOUR">
     <p:spTree>
       <p:nvGrpSpPr>
         <p:cNvPr id="1" name=""/>
@@ -4347,7 +4347,7 @@
           <a:p>
             <a:r>
               <a:rPr lang="zh-CN" altLang="en-US" smtClean="0"/>
-              <a:t>单击此处编辑母版标题样式</a:t>
+              <a:t>HELLO</a:t>
             </a:r>
             <a:endParaRPr lang="zh-CN" altLang="en-US"/>
           </a:p>
@@ -4404,35 +4404,35 @@
             <a:pPr lvl="0"/>
             <a:r>
               <a:rPr lang="zh-CN" altLang="en-US" smtClean="0"/>
-              <a:t>单击此处编辑母版文本样式</a:t>
+              <a:t>SOMETHING</a:t>
             </a:r>
           </a:p>
           <a:p>
             <a:pPr lvl="1"/>
             <a:r>
               <a:rPr lang="zh-CN" altLang="en-US" smtClean="0"/>
-              <a:t>第二级</a:t>
+              <a:t>FOO</a:t>
             </a:r>
           </a:p>
           <a:p>
             <a:pPr lvl="2"/>
             <a:r>
               <a:rPr lang="zh-CN" altLang="en-US" smtClean="0"/>
-              <a:t>第三级</a:t>
+              <a:t>BAR</a:t>
             </a:r>
           </a:p>
           <a:p>
             <a:pPr lvl="3"/>
             <a:r>
               <a:rPr lang="zh-CN" altLang="en-US" smtClean="0"/>
-              <a:t>第四级</a:t>
+              <a:t>BAR</a:t>
             </a:r>
           </a:p>
           <a:p>
             <a:pPr lvl="4"/>
             <a:r>
               <a:rPr lang="zh-CN" altLang="en-US" smtClean="0"/>
-              <a:t>第五级</a:t>
+              <a:t>BAZ</a:t>
             </a:r>
             <a:endParaRPr lang="zh-CN" altLang="en-US"/>
           </a:p>
@@ -4489,35 +4489,35 @@
             <a:pPr lvl="0"/>
             <a:r>
               <a:rPr lang="zh-CN" altLang="en-US" smtClean="0"/>
-              <a:t>单击此处编辑母版文本样式</a:t>
+              <a:t>SOMETHING</a:t>
             </a:r>
           </a:p>
           <a:p>
             <a:pPr lvl="1"/>
             <a:r>
               <a:rPr lang="zh-CN" altLang="en-US" smtClean="0"/>
-              <a:t>第二级</a:t>
+              <a:t>FOO</a:t>
             </a:r>
           </a:p>
           <a:p>
             <a:pPr lvl="2"/>
             <a:r>
               <a:rPr lang="zh-CN" altLang="en-US" smtClean="0"/>
-              <a:t>第三级</a:t>
+              <a:t>BAR</a:t>
             </a:r>
           </a:p>
           <a:p>
             <a:pPr lvl="3"/>
             <a:r>
               <a:rPr lang="zh-CN" altLang="en-US" smtClean="0"/>
-              <a:t>第四级</a:t>
+              <a:t>BAR</a:t>
             </a:r>
           </a:p>
           <a:p>
             <a:pPr lvl="4"/>
             <a:r>
               <a:rPr lang="zh-CN" altLang="en-US" smtClean="0"/>
-              <a:t>第五级</a:t>
+              <a:t>BAZ</a:t>
             </a:r>
             <a:endParaRPr lang="zh-CN" altLang="en-US"/>
           </a:p>
@@ -4598,7 +4598,7 @@
 
 <file path=ppt/slideLayouts/slideLayout5.xml><?xml version="1.0" encoding="utf-8"?>
 <p:sldLayout xmlns:a="http://schemas.openxmlformats.org/drawingml/2006/main" xmlns:r="http://schemas.openxmlformats.org/officeDocument/2006/relationships" xmlns:p="http://schemas.openxmlformats.org/presentationml/2006/main" type="twoTxTwoObj" preserve="1">
-  <p:cSld name="比较">
+  <p:cSld name="EG">
     <p:spTree>
       <p:nvGrpSpPr>
         <p:cNvPr id="1" name=""/>
@@ -4634,7 +4634,7 @@
           <a:p>
             <a:r>
               <a:rPr lang="zh-CN" altLang="en-US" smtClean="0"/>
-              <a:t>单击此处编辑母版标题样式</a:t>
+              <a:t>HELLO</a:t>
             </a:r>
             <a:endParaRPr lang="zh-CN" altLang="en-US"/>
           </a:p>
@@ -4700,7 +4700,7 @@
             <a:pPr lvl="0"/>
             <a:r>
               <a:rPr lang="zh-CN" altLang="en-US" smtClean="0"/>
-              <a:t>单击此处编辑母版文本样式</a:t>
+              <a:t>SOMETHING</a:t>
             </a:r>
           </a:p>
         </p:txBody>
@@ -4756,35 +4756,35 @@
             <a:pPr lvl="0"/>
             <a:r>
               <a:rPr lang="zh-CN" altLang="en-US" smtClean="0"/>
-              <a:t>单击此处编辑母版文本样式</a:t>
+              <a:t>SOMETHING</a:t>
             </a:r>
           </a:p>
           <a:p>
             <a:pPr lvl="1"/>
             <a:r>
               <a:rPr lang="zh-CN" altLang="en-US" smtClean="0"/>
-              <a:t>第二级</a:t>
+              <a:t>FOO</a:t>
             </a:r>
           </a:p>
           <a:p>
             <a:pPr lvl="2"/>
             <a:r>
               <a:rPr lang="zh-CN" altLang="en-US" smtClean="0"/>
-              <a:t>第三级</a:t>
+              <a:t>BAR</a:t>
             </a:r>
           </a:p>
           <a:p>
             <a:pPr lvl="3"/>
             <a:r>
               <a:rPr lang="zh-CN" altLang="en-US" smtClean="0"/>
-              <a:t>第四级</a:t>
+              <a:t>BAR</a:t>
             </a:r>
           </a:p>
           <a:p>
             <a:pPr lvl="4"/>
             <a:r>
               <a:rPr lang="zh-CN" altLang="en-US" smtClean="0"/>
-              <a:t>第五级</a:t>
+              <a:t>BAZ</a:t>
             </a:r>
             <a:endParaRPr lang="zh-CN" altLang="en-US"/>
           </a:p>
@@ -4850,7 +4850,7 @@
             <a:pPr lvl="0"/>
             <a:r>
               <a:rPr lang="zh-CN" altLang="en-US" smtClean="0"/>
-              <a:t>单击此处编辑母版文本样式</a:t>
+              <a:t>SOMETHING</a:t>
             </a:r>
           </a:p>
         </p:txBody>
@@ -4906,35 +4906,35 @@
             <a:pPr lvl="0"/>
             <a:r>
               <a:rPr lang="zh-CN" altLang="en-US" smtClean="0"/>
-              <a:t>单击此处编辑母版文本样式</a:t>
+              <a:t>SOMETHING</a:t>
             </a:r>
           </a:p>
           <a:p>
             <a:pPr lvl="1"/>
             <a:r>
               <a:rPr lang="zh-CN" altLang="en-US" smtClean="0"/>
-              <a:t>第二级</a:t>
+              <a:t>FOO</a:t>
             </a:r>
           </a:p>
           <a:p>
             <a:pPr lvl="2"/>
             <a:r>
               <a:rPr lang="zh-CN" altLang="en-US" smtClean="0"/>
-              <a:t>第三级</a:t>
+              <a:t>BAR</a:t>
             </a:r>
           </a:p>
           <a:p>
             <a:pPr lvl="3"/>
             <a:r>
               <a:rPr lang="zh-CN" altLang="en-US" smtClean="0"/>
-              <a:t>第四级</a:t>
+              <a:t>BAR</a:t>
             </a:r>
           </a:p>
           <a:p>
             <a:pPr lvl="4"/>
             <a:r>
               <a:rPr lang="zh-CN" altLang="en-US" smtClean="0"/>
-              <a:t>第五级</a:t>
+              <a:t>BAZ</a:t>
             </a:r>
             <a:endParaRPr lang="zh-CN" altLang="en-US"/>
           </a:p>
@@ -5015,7 +5015,7 @@
 
 <file path=ppt/slideLayouts/slideLayout6.xml><?xml version="1.0" encoding="utf-8"?>
 <p:sldLayout xmlns:a="http://schemas.openxmlformats.org/drawingml/2006/main" xmlns:r="http://schemas.openxmlformats.org/officeDocument/2006/relationships" xmlns:p="http://schemas.openxmlformats.org/presentationml/2006/main" type="titleOnly" preserve="1">
-  <p:cSld name="仅标题">
+  <p:cSld name="ABC">
     <p:spTree>
       <p:nvGrpSpPr>
         <p:cNvPr id="1" name=""/>
@@ -5047,7 +5047,7 @@
           <a:p>
             <a:r>
               <a:rPr lang="zh-CN" altLang="en-US" smtClean="0"/>
-              <a:t>单击此处编辑母版标题样式</a:t>
+              <a:t>HELLO</a:t>
             </a:r>
             <a:endParaRPr lang="zh-CN" altLang="en-US"/>
           </a:p>
@@ -5128,7 +5128,7 @@
 
 <file path=ppt/slideLayouts/slideLayout7.xml><?xml version="1.0" encoding="utf-8"?>
 <p:sldLayout xmlns:a="http://schemas.openxmlformats.org/drawingml/2006/main" xmlns:r="http://schemas.openxmlformats.org/officeDocument/2006/relationships" xmlns:p="http://schemas.openxmlformats.org/presentationml/2006/main" type="blank" preserve="1">
-  <p:cSld name="空白">
+  <p:cSld name="XY">
     <p:spTree>
       <p:nvGrpSpPr>
         <p:cNvPr id="1" name=""/>
@@ -5218,7 +5218,7 @@
 
 <file path=ppt/slideLayouts/slideLayout8.xml><?xml version="1.0" encoding="utf-8"?>
 <p:sldLayout xmlns:a="http://schemas.openxmlformats.org/drawingml/2006/main" xmlns:r="http://schemas.openxmlformats.org/officeDocument/2006/relationships" xmlns:p="http://schemas.openxmlformats.org/presentationml/2006/main" type="objTx" preserve="1">
-  <p:cSld name="内容与标题">
+  <p:cSld name="ABCDEF">
     <p:spTree>
       <p:nvGrpSpPr>
         <p:cNvPr id="1" name=""/>
@@ -5259,7 +5259,7 @@
           <a:p>
             <a:r>
               <a:rPr lang="zh-CN" altLang="en-US" smtClean="0"/>
-              <a:t>单击此处编辑母版标题样式</a:t>
+              <a:t>HELLO</a:t>
             </a:r>
             <a:endParaRPr lang="zh-CN" altLang="en-US"/>
           </a:p>
@@ -5316,35 +5316,35 @@
             <a:pPr lvl="0"/>
             <a:r>
               <a:rPr lang="zh-CN" altLang="en-US" smtClean="0"/>
-              <a:t>单击此处编辑母版文本样式</a:t>
+              <a:t>SOMETHING</a:t>
             </a:r>
           </a:p>
           <a:p>
             <a:pPr lvl="1"/>
             <a:r>
               <a:rPr lang="zh-CN" altLang="en-US" smtClean="0"/>
-              <a:t>第二级</a:t>
+              <a:t>FOO</a:t>
             </a:r>
           </a:p>
           <a:p>
             <a:pPr lvl="2"/>
             <a:r>
               <a:rPr lang="zh-CN" altLang="en-US" smtClean="0"/>
-              <a:t>第三级</a:t>
+              <a:t>BAR</a:t>
             </a:r>
           </a:p>
           <a:p>
             <a:pPr lvl="3"/>
             <a:r>
               <a:rPr lang="zh-CN" altLang="en-US" smtClean="0"/>
-              <a:t>第四级</a:t>
+              <a:t>BAR</a:t>
             </a:r>
           </a:p>
           <a:p>
             <a:pPr lvl="4"/>
             <a:r>
               <a:rPr lang="zh-CN" altLang="en-US" smtClean="0"/>
-              <a:t>第五级</a:t>
+              <a:t>BAZ</a:t>
             </a:r>
             <a:endParaRPr lang="zh-CN" altLang="en-US"/>
           </a:p>
@@ -5410,7 +5410,7 @@
             <a:pPr lvl="0"/>
             <a:r>
               <a:rPr lang="zh-CN" altLang="en-US" smtClean="0"/>
-              <a:t>单击此处编辑母版文本样式</a:t>
+              <a:t>SOMETHING</a:t>
             </a:r>
           </a:p>
         </p:txBody>
@@ -5490,7 +5490,7 @@
 
 <file path=ppt/slideLayouts/slideLayout9.xml><?xml version="1.0" encoding="utf-8"?>
 <p:sldLayout xmlns:a="http://schemas.openxmlformats.org/drawingml/2006/main" xmlns:r="http://schemas.openxmlformats.org/officeDocument/2006/relationships" xmlns:p="http://schemas.openxmlformats.org/presentationml/2006/main" type="picTx" preserve="1">
-  <p:cSld name="图片与标题">
+  <p:cSld name="HIJKL">
     <p:spTree>
       <p:nvGrpSpPr>
         <p:cNvPr id="1" name=""/>
@@ -5531,7 +5531,7 @@
           <a:p>
             <a:r>
               <a:rPr lang="zh-CN" altLang="en-US" smtClean="0"/>
-              <a:t>单击此处编辑母版标题样式</a:t>
+              <a:t>HELLO</a:t>
             </a:r>
             <a:endParaRPr lang="zh-CN" altLang="en-US"/>
           </a:p>
@@ -5658,7 +5658,7 @@
             <a:pPr lvl="0"/>
             <a:r>
               <a:rPr lang="zh-CN" altLang="en-US" smtClean="0"/>
-              <a:t>单击此处编辑母版文本样式</a:t>
+              <a:t>SOMETHING</a:t>
             </a:r>
           </a:p>
         </p:txBody>
@@ -5785,7 +5785,7 @@
           <a:p>
             <a:r>
               <a:rPr lang="zh-CN" altLang="en-US" smtClean="0"/>
-              <a:t>单击此处编辑母版标题样式</a:t>
+              <a:t>HELLO</a:t>
             </a:r>
             <a:endParaRPr lang="zh-CN" altLang="en-US"/>
           </a:p>
@@ -5819,35 +5819,35 @@
             <a:pPr lvl="0"/>
             <a:r>
               <a:rPr lang="zh-CN" altLang="en-US" smtClean="0"/>
-              <a:t>单击此处编辑母版文本样式</a:t>
+              <a:t>SOMETHING</a:t>
             </a:r>
           </a:p>
           <a:p>
             <a:pPr lvl="1"/>
             <a:r>
               <a:rPr lang="zh-CN" altLang="en-US" smtClean="0"/>
-              <a:t>第二级</a:t>
+              <a:t>FOO</a:t>
             </a:r>
           </a:p>
           <a:p>
             <a:pPr lvl="2"/>
             <a:r>
               <a:rPr lang="zh-CN" altLang="en-US" smtClean="0"/>
-              <a:t>第三级</a:t>
+              <a:t>BAR</a:t>
             </a:r>
           </a:p>
           <a:p>
             <a:pPr lvl="3"/>
             <a:r>
               <a:rPr lang="zh-CN" altLang="en-US" smtClean="0"/>
-              <a:t>第四级</a:t>
+              <a:t>BAR</a:t>
             </a:r>
           </a:p>
           <a:p>
             <a:pPr lvl="4"/>
             <a:r>
               <a:rPr lang="zh-CN" altLang="en-US" smtClean="0"/>
-              <a:t>第五级</a:t>
+              <a:t>BAZ</a:t>
             </a:r>
             <a:endParaRPr lang="zh-CN" altLang="en-US"/>
           </a:p>

</xml_diff>